<commit_message>
updated with hidden slides for recording
</commit_message>
<xml_diff>
--- a/SESIoN Proposal.pptx
+++ b/SESIoN Proposal.pptx
@@ -258,7 +258,7 @@
           <a:p>
             <a:fld id="{6E5C0719-993D-42E1-80ED-8F01056F36C2}" type="datetimeFigureOut">
               <a:rPr lang="en-US" smtClean="0"/>
-              <a:t>10/8/20</a:t>
+              <a:t>10/9/20</a:t>
             </a:fld>
             <a:endParaRPr lang="en-US" dirty="0"/>
           </a:p>
@@ -435,7 +435,7 @@
           <a:p>
             <a:fld id="{21D3BC9C-6C58-464F-B94E-FD73C5FB016E}" type="datetimeFigureOut">
               <a:rPr lang="en-US" smtClean="0"/>
-              <a:t>10/8/20</a:t>
+              <a:t>10/9/20</a:t>
             </a:fld>
             <a:endParaRPr lang="en-US" dirty="0"/>
           </a:p>
@@ -1941,7 +1941,7 @@
           <a:p>
             <a:fld id="{40DA1498-92C7-4E4B-8045-C9195F453964}" type="datetimeFigureOut">
               <a:rPr lang="en-US" smtClean="0"/>
-              <a:t>10/8/20</a:t>
+              <a:t>10/9/20</a:t>
             </a:fld>
             <a:endParaRPr lang="en-US" dirty="0"/>
           </a:p>
@@ -2139,7 +2139,7 @@
           <a:p>
             <a:fld id="{40DA1498-92C7-4E4B-8045-C9195F453964}" type="datetimeFigureOut">
               <a:rPr lang="en-US" smtClean="0"/>
-              <a:t>10/8/20</a:t>
+              <a:t>10/9/20</a:t>
             </a:fld>
             <a:endParaRPr lang="en-US" dirty="0"/>
           </a:p>
@@ -2347,7 +2347,7 @@
           <a:p>
             <a:fld id="{40DA1498-92C7-4E4B-8045-C9195F453964}" type="datetimeFigureOut">
               <a:rPr lang="en-US" smtClean="0"/>
-              <a:t>10/8/20</a:t>
+              <a:t>10/9/20</a:t>
             </a:fld>
             <a:endParaRPr lang="en-US" dirty="0"/>
           </a:p>
@@ -2545,7 +2545,7 @@
           <a:p>
             <a:fld id="{40DA1498-92C7-4E4B-8045-C9195F453964}" type="datetimeFigureOut">
               <a:rPr lang="en-US" smtClean="0"/>
-              <a:t>10/8/20</a:t>
+              <a:t>10/9/20</a:t>
             </a:fld>
             <a:endParaRPr lang="en-US" dirty="0"/>
           </a:p>
@@ -2820,7 +2820,7 @@
           <a:p>
             <a:fld id="{40DA1498-92C7-4E4B-8045-C9195F453964}" type="datetimeFigureOut">
               <a:rPr lang="en-US" smtClean="0"/>
-              <a:t>10/8/20</a:t>
+              <a:t>10/9/20</a:t>
             </a:fld>
             <a:endParaRPr lang="en-US" dirty="0"/>
           </a:p>
@@ -3085,7 +3085,7 @@
           <a:p>
             <a:fld id="{40DA1498-92C7-4E4B-8045-C9195F453964}" type="datetimeFigureOut">
               <a:rPr lang="en-US" smtClean="0"/>
-              <a:t>10/8/20</a:t>
+              <a:t>10/9/20</a:t>
             </a:fld>
             <a:endParaRPr lang="en-US" dirty="0"/>
           </a:p>
@@ -3497,7 +3497,7 @@
           <a:p>
             <a:fld id="{40DA1498-92C7-4E4B-8045-C9195F453964}" type="datetimeFigureOut">
               <a:rPr lang="en-US" smtClean="0"/>
-              <a:t>10/8/20</a:t>
+              <a:t>10/9/20</a:t>
             </a:fld>
             <a:endParaRPr lang="en-US" dirty="0"/>
           </a:p>
@@ -3638,7 +3638,7 @@
           <a:p>
             <a:fld id="{40DA1498-92C7-4E4B-8045-C9195F453964}" type="datetimeFigureOut">
               <a:rPr lang="en-US" smtClean="0"/>
-              <a:t>10/8/20</a:t>
+              <a:t>10/9/20</a:t>
             </a:fld>
             <a:endParaRPr lang="en-US" dirty="0"/>
           </a:p>
@@ -3751,7 +3751,7 @@
           <a:p>
             <a:fld id="{40DA1498-92C7-4E4B-8045-C9195F453964}" type="datetimeFigureOut">
               <a:rPr lang="en-US" smtClean="0"/>
-              <a:t>10/8/20</a:t>
+              <a:t>10/9/20</a:t>
             </a:fld>
             <a:endParaRPr lang="en-US" dirty="0"/>
           </a:p>
@@ -4062,7 +4062,7 @@
           <a:p>
             <a:fld id="{40DA1498-92C7-4E4B-8045-C9195F453964}" type="datetimeFigureOut">
               <a:rPr lang="en-US" smtClean="0"/>
-              <a:t>10/8/20</a:t>
+              <a:t>10/9/20</a:t>
             </a:fld>
             <a:endParaRPr lang="en-US" dirty="0"/>
           </a:p>
@@ -4354,7 +4354,7 @@
           <a:p>
             <a:fld id="{40DA1498-92C7-4E4B-8045-C9195F453964}" type="datetimeFigureOut">
               <a:rPr lang="en-US" smtClean="0"/>
-              <a:t>10/8/20</a:t>
+              <a:t>10/9/20</a:t>
             </a:fld>
             <a:endParaRPr lang="en-US" dirty="0"/>
           </a:p>
@@ -4595,7 +4595,7 @@
           <a:p>
             <a:fld id="{40DA1498-92C7-4E4B-8045-C9195F453964}" type="datetimeFigureOut">
               <a:rPr lang="en-US" smtClean="0"/>
-              <a:t>10/8/20</a:t>
+              <a:t>10/9/20</a:t>
             </a:fld>
             <a:endParaRPr lang="en-US" dirty="0"/>
           </a:p>
@@ -6520,7 +6520,7 @@
 </file>
 
 <file path=ppt/slides/slide10.xml><?xml version="1.0" encoding="utf-8"?>
-<p:sld xmlns:a="http://schemas.openxmlformats.org/drawingml/2006/main" xmlns:r="http://schemas.openxmlformats.org/officeDocument/2006/relationships" xmlns:p="http://schemas.openxmlformats.org/presentationml/2006/main">
+<p:sld xmlns:a="http://schemas.openxmlformats.org/drawingml/2006/main" xmlns:r="http://schemas.openxmlformats.org/officeDocument/2006/relationships" xmlns:p="http://schemas.openxmlformats.org/presentationml/2006/main" show="0">
   <p:cSld>
     <p:spTree>
       <p:nvGrpSpPr>
@@ -6737,8 +6737,8 @@
           </a:fontRef>
         </p:style>
       </p:cxnSp>
-      <mc:AlternateContent xmlns:mc="http://schemas.openxmlformats.org/markup-compatibility/2006">
-        <mc:Choice xmlns:a14="http://schemas.microsoft.com/office/drawing/2010/main" Requires="a14">
+      <mc:AlternateContent xmlns:mc="http://schemas.openxmlformats.org/markup-compatibility/2006" xmlns:a14="http://schemas.microsoft.com/office/drawing/2010/main">
+        <mc:Choice Requires="a14">
           <p:sp>
             <p:nvSpPr>
               <p:cNvPr id="10" name="Rectangle 9">
@@ -7331,7 +7331,7 @@
             </p:txBody>
           </p:sp>
         </mc:Choice>
-        <mc:Fallback>
+        <mc:Fallback xmlns="">
           <p:sp>
             <p:nvSpPr>
               <p:cNvPr id="10" name="Rectangle 9">
@@ -7622,7 +7622,7 @@
         <p:spPr>
           <a:xfrm>
             <a:off x="228600" y="1486891"/>
-            <a:ext cx="11596125" cy="2680221"/>
+            <a:ext cx="11596125" cy="3167534"/>
           </a:xfrm>
           <a:prstGeom prst="rect">
             <a:avLst/>
@@ -7711,9 +7711,6 @@
               </a:rPr>
               <a:t>11</a:t>
             </a:r>
-            <a:endParaRPr lang="en-US" dirty="0">
-              <a:cs typeface="Segoe UI" panose="020B0502040204020203" pitchFamily="34" charset="0"/>
-            </a:endParaRPr>
           </a:p>
           <a:p>
             <a:pPr marL="285750" indent="-285750">
@@ -7723,9 +7720,37 @@
               <a:buFont typeface="Arial" panose="020B0604020202020204" pitchFamily="34" charset="0"/>
               <a:buChar char="•"/>
             </a:pPr>
-            <a:endParaRPr lang="en-US" dirty="0">
+            <a:endParaRPr lang="en-US" baseline="30000" dirty="0">
               <a:cs typeface="Segoe UI" panose="020B0502040204020203" pitchFamily="34" charset="0"/>
             </a:endParaRPr>
+          </a:p>
+          <a:p>
+            <a:pPr>
+              <a:lnSpc>
+                <a:spcPts val="1900"/>
+              </a:lnSpc>
+            </a:pPr>
+            <a:r>
+              <a:rPr lang="en-US" b="1" u="sng" dirty="0">
+                <a:cs typeface="Segoe UI" panose="020B0502040204020203" pitchFamily="34" charset="0"/>
+              </a:rPr>
+              <a:t>Checks for Success</a:t>
+            </a:r>
+          </a:p>
+          <a:p>
+            <a:pPr marL="285750" indent="-285750">
+              <a:lnSpc>
+                <a:spcPts val="1900"/>
+              </a:lnSpc>
+              <a:buFont typeface="Arial" panose="020B0604020202020204" pitchFamily="34" charset="0"/>
+              <a:buChar char="•"/>
+            </a:pPr>
+            <a:r>
+              <a:rPr lang="en-US" dirty="0">
+                <a:cs typeface="Segoe UI" panose="020B0502040204020203" pitchFamily="34" charset="0"/>
+              </a:rPr>
+              <a:t>Cleaned data, preliminary model, functioning choropleth in D3 by end of October</a:t>
+            </a:r>
           </a:p>
           <a:p>
             <a:pPr marL="285750" indent="-285750">
@@ -24678,7 +24703,7 @@
 </file>
 
 <file path=ppt/slides/slide5.xml><?xml version="1.0" encoding="utf-8"?>
-<p:sld xmlns:a="http://schemas.openxmlformats.org/drawingml/2006/main" xmlns:r="http://schemas.openxmlformats.org/officeDocument/2006/relationships" xmlns:p="http://schemas.openxmlformats.org/presentationml/2006/main">
+<p:sld xmlns:a="http://schemas.openxmlformats.org/drawingml/2006/main" xmlns:r="http://schemas.openxmlformats.org/officeDocument/2006/relationships" xmlns:p="http://schemas.openxmlformats.org/presentationml/2006/main" show="0">
   <p:cSld>
     <p:spTree>
       <p:nvGrpSpPr>
@@ -25746,7 +25771,7 @@
 </file>
 
 <file path=ppt/slides/slide7.xml><?xml version="1.0" encoding="utf-8"?>
-<p:sld xmlns:a="http://schemas.openxmlformats.org/drawingml/2006/main" xmlns:r="http://schemas.openxmlformats.org/officeDocument/2006/relationships" xmlns:p="http://schemas.openxmlformats.org/presentationml/2006/main">
+<p:sld xmlns:a="http://schemas.openxmlformats.org/drawingml/2006/main" xmlns:r="http://schemas.openxmlformats.org/officeDocument/2006/relationships" xmlns:p="http://schemas.openxmlformats.org/presentationml/2006/main" show="0">
   <p:cSld>
     <p:spTree>
       <p:nvGrpSpPr>
@@ -27032,7 +27057,7 @@
 </file>
 
 <file path=ppt/slides/slide9.xml><?xml version="1.0" encoding="utf-8"?>
-<p:sld xmlns:a="http://schemas.openxmlformats.org/drawingml/2006/main" xmlns:r="http://schemas.openxmlformats.org/officeDocument/2006/relationships" xmlns:p="http://schemas.openxmlformats.org/presentationml/2006/main">
+<p:sld xmlns:a="http://schemas.openxmlformats.org/drawingml/2006/main" xmlns:r="http://schemas.openxmlformats.org/officeDocument/2006/relationships" xmlns:p="http://schemas.openxmlformats.org/presentationml/2006/main" show="0">
   <p:cSld>
     <p:spTree>
       <p:nvGrpSpPr>
@@ -28268,23 +28293,6 @@
 </file>
 
 <file path=customXml/item1.xml><?xml version="1.0" encoding="utf-8"?>
-<?mso-contentType ?>
-<FormTemplates xmlns="http://schemas.microsoft.com/sharepoint/v3/contenttype/forms">
-  <Display>DocumentLibraryForm</Display>
-  <Edit>DocumentLibraryForm</Edit>
-  <New>DocumentLibraryForm</New>
-</FormTemplates>
-</file>
-
-<file path=customXml/item2.xml><?xml version="1.0" encoding="utf-8"?>
-<p:properties xmlns:p="http://schemas.microsoft.com/office/2006/metadata/properties" xmlns:xsi="http://www.w3.org/2001/XMLSchema-instance" xmlns:pc="http://schemas.microsoft.com/office/infopath/2007/PartnerControls">
-  <documentManagement>
-    <MediaServiceKeyPoints xmlns="71af3243-3dd4-4a8d-8c0d-dd76da1f02a5" xsi:nil="true"/>
-  </documentManagement>
-</p:properties>
-</file>
-
-<file path=customXml/item3.xml><?xml version="1.0" encoding="utf-8"?>
 <ct:contentTypeSchema xmlns:ct="http://schemas.microsoft.com/office/2006/metadata/contentType" xmlns:ma="http://schemas.microsoft.com/office/2006/metadata/properties/metaAttributes" ct:_="" ma:_="" ma:contentTypeName="Document" ma:contentTypeID="0x01010079F111ED35F8CC479449609E8A0923A6" ma:contentTypeVersion="11" ma:contentTypeDescription="Create a new document." ma:contentTypeScope="" ma:versionID="9677210f24a1be23c92c90fd886aa0aa">
   <xsd:schema xmlns:xsd="http://www.w3.org/2001/XMLSchema" xmlns:xs="http://www.w3.org/2001/XMLSchema" xmlns:p="http://schemas.microsoft.com/office/2006/metadata/properties" xmlns:ns2="71af3243-3dd4-4a8d-8c0d-dd76da1f02a5" xmlns:ns3="16c05727-aa75-4e4a-9b5f-8a80a1165891" targetNamespace="http://schemas.microsoft.com/office/2006/metadata/properties" ma:root="true" ma:fieldsID="60e05723c5c1908df1a1a4ebf11d344e" ns2:_="" ns3:_="">
     <xsd:import namespace="71af3243-3dd4-4a8d-8c0d-dd76da1f02a5"/>
@@ -28495,25 +28503,24 @@
 </ct:contentTypeSchema>
 </file>
 
-<file path=customXml/itemProps1.xml><?xml version="1.0" encoding="utf-8"?>
-<ds:datastoreItem xmlns:ds="http://schemas.openxmlformats.org/officeDocument/2006/customXml" ds:itemID="{2FD05317-60D6-4B3A-8545-888496D1A8EC}">
-  <ds:schemaRefs>
-    <ds:schemaRef ds:uri="http://schemas.microsoft.com/sharepoint/v3/contenttype/forms"/>
-  </ds:schemaRefs>
-</ds:datastoreItem>
+<file path=customXml/item2.xml><?xml version="1.0" encoding="utf-8"?>
+<p:properties xmlns:p="http://schemas.microsoft.com/office/2006/metadata/properties" xmlns:xsi="http://www.w3.org/2001/XMLSchema-instance" xmlns:pc="http://schemas.microsoft.com/office/infopath/2007/PartnerControls">
+  <documentManagement>
+    <MediaServiceKeyPoints xmlns="71af3243-3dd4-4a8d-8c0d-dd76da1f02a5" xsi:nil="true"/>
+  </documentManagement>
+</p:properties>
 </file>
 
-<file path=customXml/itemProps2.xml><?xml version="1.0" encoding="utf-8"?>
-<ds:datastoreItem xmlns:ds="http://schemas.openxmlformats.org/officeDocument/2006/customXml" ds:itemID="{EF609EDA-869E-4BE5-AE5D-B898C584B6FF}">
-  <ds:schemaRefs>
-    <ds:schemaRef ds:uri="http://schemas.microsoft.com/office/2006/metadata/properties"/>
-    <ds:schemaRef ds:uri="http://schemas.microsoft.com/office/infopath/2007/PartnerControls"/>
-    <ds:schemaRef ds:uri="71af3243-3dd4-4a8d-8c0d-dd76da1f02a5"/>
-  </ds:schemaRefs>
-</ds:datastoreItem>
+<file path=customXml/item3.xml><?xml version="1.0" encoding="utf-8"?>
+<?mso-contentType ?>
+<FormTemplates xmlns="http://schemas.microsoft.com/sharepoint/v3/contenttype/forms">
+  <Display>DocumentLibraryForm</Display>
+  <Edit>DocumentLibraryForm</Edit>
+  <New>DocumentLibraryForm</New>
+</FormTemplates>
 </file>
 
-<file path=customXml/itemProps3.xml><?xml version="1.0" encoding="utf-8"?>
+<file path=customXml/itemProps1.xml><?xml version="1.0" encoding="utf-8"?>
 <ds:datastoreItem xmlns:ds="http://schemas.openxmlformats.org/officeDocument/2006/customXml" ds:itemID="{61A00BBF-EEBB-4E18-B8CB-F926EAAC48F7}">
   <ds:schemaRefs>
     <ds:schemaRef ds:uri="http://schemas.microsoft.com/office/2006/metadata/contentType"/>
@@ -28530,4 +28537,22 @@
     <ds:schemaRef ds:uri="http://schemas.microsoft.com/internal/obd"/>
   </ds:schemaRefs>
 </ds:datastoreItem>
+</file>
+
+<file path=customXml/itemProps2.xml><?xml version="1.0" encoding="utf-8"?>
+<ds:datastoreItem xmlns:ds="http://schemas.openxmlformats.org/officeDocument/2006/customXml" ds:itemID="{EF609EDA-869E-4BE5-AE5D-B898C584B6FF}">
+  <ds:schemaRefs>
+    <ds:schemaRef ds:uri="http://schemas.microsoft.com/office/2006/metadata/properties"/>
+    <ds:schemaRef ds:uri="http://schemas.microsoft.com/office/infopath/2007/PartnerControls"/>
+    <ds:schemaRef ds:uri="71af3243-3dd4-4a8d-8c0d-dd76da1f02a5"/>
+  </ds:schemaRefs>
+</ds:datastoreItem>
+</file>
+
+<file path=customXml/itemProps3.xml><?xml version="1.0" encoding="utf-8"?>
+<ds:datastoreItem xmlns:ds="http://schemas.openxmlformats.org/officeDocument/2006/customXml" ds:itemID="{2FD05317-60D6-4B3A-8545-888496D1A8EC}">
+  <ds:schemaRefs>
+    <ds:schemaRef ds:uri="http://schemas.microsoft.com/sharepoint/v3/contenttype/forms"/>
+  </ds:schemaRefs>
+</ds:datastoreItem>
 </file>
</xml_diff>

<commit_message>
first commit and scripts and stuff
</commit_message>
<xml_diff>
--- a/SESIoN Proposal.pptx
+++ b/SESIoN Proposal.pptx
@@ -6520,7 +6520,7 @@
 </file>
 
 <file path=ppt/slides/slide10.xml><?xml version="1.0" encoding="utf-8"?>
-<p:sld xmlns:a="http://schemas.openxmlformats.org/drawingml/2006/main" xmlns:r="http://schemas.openxmlformats.org/officeDocument/2006/relationships" xmlns:p="http://schemas.openxmlformats.org/presentationml/2006/main" show="0">
+<p:sld xmlns:a="http://schemas.openxmlformats.org/drawingml/2006/main" xmlns:r="http://schemas.openxmlformats.org/officeDocument/2006/relationships" xmlns:p="http://schemas.openxmlformats.org/presentationml/2006/main">
   <p:cSld>
     <p:spTree>
       <p:nvGrpSpPr>
@@ -24703,7 +24703,7 @@
 </file>
 
 <file path=ppt/slides/slide5.xml><?xml version="1.0" encoding="utf-8"?>
-<p:sld xmlns:a="http://schemas.openxmlformats.org/drawingml/2006/main" xmlns:r="http://schemas.openxmlformats.org/officeDocument/2006/relationships" xmlns:p="http://schemas.openxmlformats.org/presentationml/2006/main" show="0">
+<p:sld xmlns:a="http://schemas.openxmlformats.org/drawingml/2006/main" xmlns:r="http://schemas.openxmlformats.org/officeDocument/2006/relationships" xmlns:p="http://schemas.openxmlformats.org/presentationml/2006/main">
   <p:cSld>
     <p:spTree>
       <p:nvGrpSpPr>
@@ -25771,7 +25771,7 @@
 </file>
 
 <file path=ppt/slides/slide7.xml><?xml version="1.0" encoding="utf-8"?>
-<p:sld xmlns:a="http://schemas.openxmlformats.org/drawingml/2006/main" xmlns:r="http://schemas.openxmlformats.org/officeDocument/2006/relationships" xmlns:p="http://schemas.openxmlformats.org/presentationml/2006/main" show="0">
+<p:sld xmlns:a="http://schemas.openxmlformats.org/drawingml/2006/main" xmlns:r="http://schemas.openxmlformats.org/officeDocument/2006/relationships" xmlns:p="http://schemas.openxmlformats.org/presentationml/2006/main">
   <p:cSld>
     <p:spTree>
       <p:nvGrpSpPr>
@@ -27057,7 +27057,7 @@
 </file>
 
 <file path=ppt/slides/slide9.xml><?xml version="1.0" encoding="utf-8"?>
-<p:sld xmlns:a="http://schemas.openxmlformats.org/drawingml/2006/main" xmlns:r="http://schemas.openxmlformats.org/officeDocument/2006/relationships" xmlns:p="http://schemas.openxmlformats.org/presentationml/2006/main" show="0">
+<p:sld xmlns:a="http://schemas.openxmlformats.org/drawingml/2006/main" xmlns:r="http://schemas.openxmlformats.org/officeDocument/2006/relationships" xmlns:p="http://schemas.openxmlformats.org/presentationml/2006/main">
   <p:cSld>
     <p:spTree>
       <p:nvGrpSpPr>
@@ -28293,6 +28293,14 @@
 </file>
 
 <file path=customXml/item1.xml><?xml version="1.0" encoding="utf-8"?>
+<p:properties xmlns:p="http://schemas.microsoft.com/office/2006/metadata/properties" xmlns:xsi="http://www.w3.org/2001/XMLSchema-instance" xmlns:pc="http://schemas.microsoft.com/office/infopath/2007/PartnerControls">
+  <documentManagement>
+    <MediaServiceKeyPoints xmlns="71af3243-3dd4-4a8d-8c0d-dd76da1f02a5" xsi:nil="true"/>
+  </documentManagement>
+</p:properties>
+</file>
+
+<file path=customXml/item2.xml><?xml version="1.0" encoding="utf-8"?>
 <ct:contentTypeSchema xmlns:ct="http://schemas.microsoft.com/office/2006/metadata/contentType" xmlns:ma="http://schemas.microsoft.com/office/2006/metadata/properties/metaAttributes" ct:_="" ma:_="" ma:contentTypeName="Document" ma:contentTypeID="0x01010079F111ED35F8CC479449609E8A0923A6" ma:contentTypeVersion="11" ma:contentTypeDescription="Create a new document." ma:contentTypeScope="" ma:versionID="9677210f24a1be23c92c90fd886aa0aa">
   <xsd:schema xmlns:xsd="http://www.w3.org/2001/XMLSchema" xmlns:xs="http://www.w3.org/2001/XMLSchema" xmlns:p="http://schemas.microsoft.com/office/2006/metadata/properties" xmlns:ns2="71af3243-3dd4-4a8d-8c0d-dd76da1f02a5" xmlns:ns3="16c05727-aa75-4e4a-9b5f-8a80a1165891" targetNamespace="http://schemas.microsoft.com/office/2006/metadata/properties" ma:root="true" ma:fieldsID="60e05723c5c1908df1a1a4ebf11d344e" ns2:_="" ns3:_="">
     <xsd:import namespace="71af3243-3dd4-4a8d-8c0d-dd76da1f02a5"/>
@@ -28503,14 +28511,6 @@
 </ct:contentTypeSchema>
 </file>
 
-<file path=customXml/item2.xml><?xml version="1.0" encoding="utf-8"?>
-<p:properties xmlns:p="http://schemas.microsoft.com/office/2006/metadata/properties" xmlns:xsi="http://www.w3.org/2001/XMLSchema-instance" xmlns:pc="http://schemas.microsoft.com/office/infopath/2007/PartnerControls">
-  <documentManagement>
-    <MediaServiceKeyPoints xmlns="71af3243-3dd4-4a8d-8c0d-dd76da1f02a5" xsi:nil="true"/>
-  </documentManagement>
-</p:properties>
-</file>
-
 <file path=customXml/item3.xml><?xml version="1.0" encoding="utf-8"?>
 <?mso-contentType ?>
 <FormTemplates xmlns="http://schemas.microsoft.com/sharepoint/v3/contenttype/forms">
@@ -28521,6 +28521,16 @@
 </file>
 
 <file path=customXml/itemProps1.xml><?xml version="1.0" encoding="utf-8"?>
+<ds:datastoreItem xmlns:ds="http://schemas.openxmlformats.org/officeDocument/2006/customXml" ds:itemID="{EF609EDA-869E-4BE5-AE5D-B898C584B6FF}">
+  <ds:schemaRefs>
+    <ds:schemaRef ds:uri="http://schemas.microsoft.com/office/2006/metadata/properties"/>
+    <ds:schemaRef ds:uri="http://schemas.microsoft.com/office/infopath/2007/PartnerControls"/>
+    <ds:schemaRef ds:uri="71af3243-3dd4-4a8d-8c0d-dd76da1f02a5"/>
+  </ds:schemaRefs>
+</ds:datastoreItem>
+</file>
+
+<file path=customXml/itemProps2.xml><?xml version="1.0" encoding="utf-8"?>
 <ds:datastoreItem xmlns:ds="http://schemas.openxmlformats.org/officeDocument/2006/customXml" ds:itemID="{61A00BBF-EEBB-4E18-B8CB-F926EAAC48F7}">
   <ds:schemaRefs>
     <ds:schemaRef ds:uri="http://schemas.microsoft.com/office/2006/metadata/contentType"/>
@@ -28539,16 +28549,6 @@
 </ds:datastoreItem>
 </file>
 
-<file path=customXml/itemProps2.xml><?xml version="1.0" encoding="utf-8"?>
-<ds:datastoreItem xmlns:ds="http://schemas.openxmlformats.org/officeDocument/2006/customXml" ds:itemID="{EF609EDA-869E-4BE5-AE5D-B898C584B6FF}">
-  <ds:schemaRefs>
-    <ds:schemaRef ds:uri="http://schemas.microsoft.com/office/2006/metadata/properties"/>
-    <ds:schemaRef ds:uri="http://schemas.microsoft.com/office/infopath/2007/PartnerControls"/>
-    <ds:schemaRef ds:uri="71af3243-3dd4-4a8d-8c0d-dd76da1f02a5"/>
-  </ds:schemaRefs>
-</ds:datastoreItem>
-</file>
-
 <file path=customXml/itemProps3.xml><?xml version="1.0" encoding="utf-8"?>
 <ds:datastoreItem xmlns:ds="http://schemas.openxmlformats.org/officeDocument/2006/customXml" ds:itemID="{2FD05317-60D6-4B3A-8545-888496D1A8EC}">
   <ds:schemaRefs>

</xml_diff>